<commit_message>
Kommentare von Prototyp hinzugefuegt
</commit_message>
<xml_diff>
--- a/docs/Praesentation_Prototyp/Prototyp_Präsentation.pptx
+++ b/docs/Praesentation_Prototyp/Prototyp_Präsentation.pptx
@@ -5,7 +5,7 @@
     <p:sldMasterId id="2147483660" r:id="rId1"/>
   </p:sldMasterIdLst>
   <p:notesMasterIdLst>
-    <p:notesMasterId r:id="rId20"/>
+    <p:notesMasterId r:id="rId19"/>
   </p:notesMasterIdLst>
   <p:sldIdLst>
     <p:sldId id="298" r:id="rId2"/>
@@ -17,32 +17,31 @@
     <p:sldId id="296" r:id="rId8"/>
     <p:sldId id="260" r:id="rId9"/>
     <p:sldId id="286" r:id="rId10"/>
-    <p:sldId id="292" r:id="rId11"/>
-    <p:sldId id="293" r:id="rId12"/>
-    <p:sldId id="300" r:id="rId13"/>
-    <p:sldId id="301" r:id="rId14"/>
-    <p:sldId id="302" r:id="rId15"/>
-    <p:sldId id="303" r:id="rId16"/>
-    <p:sldId id="288" r:id="rId17"/>
-    <p:sldId id="289" r:id="rId18"/>
-    <p:sldId id="282" r:id="rId19"/>
+    <p:sldId id="293" r:id="rId11"/>
+    <p:sldId id="300" r:id="rId12"/>
+    <p:sldId id="301" r:id="rId13"/>
+    <p:sldId id="302" r:id="rId14"/>
+    <p:sldId id="303" r:id="rId15"/>
+    <p:sldId id="288" r:id="rId16"/>
+    <p:sldId id="289" r:id="rId17"/>
+    <p:sldId id="282" r:id="rId18"/>
   </p:sldIdLst>
   <p:sldSz cx="9144000" cy="5143500" type="screen16x9"/>
   <p:notesSz cx="6858000" cy="9144000"/>
   <p:embeddedFontLst>
     <p:embeddedFont>
-      <p:font typeface="Poppins" panose="020B0604020202020204" charset="0"/>
-      <p:regular r:id="rId21"/>
-      <p:bold r:id="rId22"/>
-      <p:italic r:id="rId23"/>
-      <p:boldItalic r:id="rId24"/>
+      <p:font typeface="Poppins" pitchFamily="2" charset="77"/>
+      <p:regular r:id="rId20"/>
+      <p:bold r:id="rId21"/>
+      <p:italic r:id="rId22"/>
+      <p:boldItalic r:id="rId23"/>
     </p:embeddedFont>
     <p:embeddedFont>
-      <p:font typeface="Poppins Light" panose="020B0604020202020204" charset="0"/>
-      <p:regular r:id="rId25"/>
-      <p:bold r:id="rId26"/>
-      <p:italic r:id="rId27"/>
-      <p:boldItalic r:id="rId28"/>
+      <p:font typeface="Poppins Light" pitchFamily="2" charset="77"/>
+      <p:regular r:id="rId24"/>
+      <p:bold r:id="rId25"/>
+      <p:italic r:id="rId26"/>
+      <p:boldItalic r:id="rId27"/>
     </p:embeddedFont>
   </p:embeddedFontLst>
   <p:defaultTextStyle>
@@ -813,6 +812,10 @@
               </a:spcAft>
               <a:buNone/>
             </a:pPr>
+            <a:r>
+              <a:rPr lang="de-DE" dirty="0"/>
+              <a:t>Bildschirmschoner</a:t>
+            </a:r>
             <a:endParaRPr dirty="0"/>
           </a:p>
         </p:txBody>
@@ -826,123 +829,6 @@
 </file>
 
 <file path=ppt/notesSlides/notesSlide10.xml><?xml version="1.0" encoding="utf-8"?>
-<p:notes xmlns:a="http://schemas.openxmlformats.org/drawingml/2006/main" xmlns:r="http://schemas.openxmlformats.org/officeDocument/2006/relationships" xmlns:p="http://schemas.openxmlformats.org/presentationml/2006/main">
-  <p:cSld>
-    <p:spTree>
-      <p:nvGrpSpPr>
-        <p:cNvPr id="1" name=""/>
-        <p:cNvGrpSpPr/>
-        <p:nvPr/>
-      </p:nvGrpSpPr>
-      <p:grpSpPr>
-        <a:xfrm>
-          <a:off x="0" y="0"/>
-          <a:ext cx="0" cy="0"/>
-          <a:chOff x="0" y="0"/>
-          <a:chExt cx="0" cy="0"/>
-        </a:xfrm>
-      </p:grpSpPr>
-      <p:sp>
-        <p:nvSpPr>
-          <p:cNvPr id="2" name="Slide Image Placeholder 1"/>
-          <p:cNvSpPr>
-            <a:spLocks noGrp="1" noRot="1" noChangeAspect="1"/>
-          </p:cNvSpPr>
-          <p:nvPr>
-            <p:ph type="sldImg"/>
-          </p:nvPr>
-        </p:nvSpPr>
-        <p:spPr>
-          <a:xfrm>
-            <a:off x="381000" y="685800"/>
-            <a:ext cx="6096000" cy="3429000"/>
-          </a:xfrm>
-        </p:spPr>
-      </p:sp>
-      <p:sp>
-        <p:nvSpPr>
-          <p:cNvPr id="3" name="Notes Placeholder 2"/>
-          <p:cNvSpPr>
-            <a:spLocks noGrp="1"/>
-          </p:cNvSpPr>
-          <p:nvPr>
-            <p:ph type="body" idx="1"/>
-          </p:nvPr>
-        </p:nvSpPr>
-        <p:spPr/>
-        <p:txBody>
-          <a:bodyPr/>
-          <a:lstStyle/>
-          <a:p>
-            <a:pPr marL="139700" indent="0">
-              <a:buNone/>
-            </a:pPr>
-            <a:r>
-              <a:rPr lang="en-US" dirty="0" err="1"/>
-              <a:t>Besondere</a:t>
-            </a:r>
-            <a:r>
-              <a:rPr lang="en-US" dirty="0"/>
-              <a:t> </a:t>
-            </a:r>
-            <a:r>
-              <a:rPr lang="en-US" dirty="0" err="1"/>
-              <a:t>teschniche</a:t>
-            </a:r>
-            <a:r>
-              <a:rPr lang="en-US" dirty="0"/>
-              <a:t> </a:t>
-            </a:r>
-            <a:r>
-              <a:rPr lang="en-US" dirty="0" err="1"/>
-              <a:t>Herausforderung</a:t>
-            </a:r>
-            <a:r>
-              <a:rPr lang="en-US" dirty="0"/>
-              <a:t>: </a:t>
-            </a:r>
-            <a:r>
-              <a:rPr lang="en-US" dirty="0" err="1"/>
-              <a:t>Applikation</a:t>
-            </a:r>
-            <a:r>
-              <a:rPr lang="en-US" dirty="0"/>
-              <a:t> von </a:t>
-            </a:r>
-            <a:r>
-              <a:rPr lang="en-US" dirty="0" err="1"/>
-              <a:t>überall</a:t>
-            </a:r>
-            <a:r>
-              <a:rPr lang="en-US" dirty="0"/>
-              <a:t> </a:t>
-            </a:r>
-            <a:r>
-              <a:rPr lang="en-US" dirty="0" err="1"/>
-              <a:t>erreichbar</a:t>
-            </a:r>
-            <a:r>
-              <a:rPr lang="en-US" dirty="0"/>
-              <a:t>. Web, Mobile, etc.</a:t>
-            </a:r>
-            <a:endParaRPr lang="en-DE" dirty="0"/>
-          </a:p>
-        </p:txBody>
-      </p:sp>
-    </p:spTree>
-    <p:extLst>
-      <p:ext uri="{BB962C8B-B14F-4D97-AF65-F5344CB8AC3E}">
-        <p14:creationId xmlns:p14="http://schemas.microsoft.com/office/powerpoint/2010/main" val="3009084432"/>
-      </p:ext>
-    </p:extLst>
-  </p:cSld>
-  <p:clrMapOvr>
-    <a:masterClrMapping/>
-  </p:clrMapOvr>
-</p:notes>
-</file>
-
-<file path=ppt/notesSlides/notesSlide11.xml><?xml version="1.0" encoding="utf-8"?>
 <p:notes xmlns:a="http://schemas.openxmlformats.org/drawingml/2006/main" xmlns:r="http://schemas.openxmlformats.org/officeDocument/2006/relationships" xmlns:p="http://schemas.openxmlformats.org/presentationml/2006/main" showMasterSp="0" showMasterPhAnim="0">
   <p:cSld>
     <p:spTree>
@@ -1059,7 +945,7 @@
 </p:notes>
 </file>
 
-<file path=ppt/notesSlides/notesSlide12.xml><?xml version="1.0" encoding="utf-8"?>
+<file path=ppt/notesSlides/notesSlide11.xml><?xml version="1.0" encoding="utf-8"?>
 <p:notes xmlns:a="http://schemas.openxmlformats.org/drawingml/2006/main" xmlns:r="http://schemas.openxmlformats.org/officeDocument/2006/relationships" xmlns:p="http://schemas.openxmlformats.org/presentationml/2006/main" showMasterSp="0" showMasterPhAnim="0">
   <p:cSld>
     <p:spTree>
@@ -1255,6 +1141,162 @@
 </p:notes>
 </file>
 
+<file path=ppt/notesSlides/notesSlide12.xml><?xml version="1.0" encoding="utf-8"?>
+<p:notes xmlns:a="http://schemas.openxmlformats.org/drawingml/2006/main" xmlns:r="http://schemas.openxmlformats.org/officeDocument/2006/relationships" xmlns:p="http://schemas.openxmlformats.org/presentationml/2006/main">
+  <p:cSld>
+    <p:spTree>
+      <p:nvGrpSpPr>
+        <p:cNvPr id="1" name=""/>
+        <p:cNvGrpSpPr/>
+        <p:nvPr/>
+      </p:nvGrpSpPr>
+      <p:grpSpPr>
+        <a:xfrm>
+          <a:off x="0" y="0"/>
+          <a:ext cx="0" cy="0"/>
+          <a:chOff x="0" y="0"/>
+          <a:chExt cx="0" cy="0"/>
+        </a:xfrm>
+      </p:grpSpPr>
+      <p:sp>
+        <p:nvSpPr>
+          <p:cNvPr id="2" name="Slide Image Placeholder 1"/>
+          <p:cNvSpPr>
+            <a:spLocks noGrp="1" noRot="1" noChangeAspect="1"/>
+          </p:cNvSpPr>
+          <p:nvPr>
+            <p:ph type="sldImg"/>
+          </p:nvPr>
+        </p:nvSpPr>
+        <p:spPr>
+          <a:xfrm>
+            <a:off x="381000" y="685800"/>
+            <a:ext cx="6096000" cy="3429000"/>
+          </a:xfrm>
+        </p:spPr>
+      </p:sp>
+      <p:sp>
+        <p:nvSpPr>
+          <p:cNvPr id="3" name="Notes Placeholder 2"/>
+          <p:cNvSpPr>
+            <a:spLocks noGrp="1"/>
+          </p:cNvSpPr>
+          <p:nvPr>
+            <p:ph type="body" idx="1"/>
+          </p:nvPr>
+        </p:nvSpPr>
+        <p:spPr/>
+        <p:txBody>
+          <a:bodyPr/>
+          <a:lstStyle/>
+          <a:p>
+            <a:pPr marL="139700" indent="0">
+              <a:buNone/>
+            </a:pPr>
+            <a:r>
+              <a:rPr lang="en-US" dirty="0"/>
+              <a:t>Problem </a:t>
+            </a:r>
+            <a:r>
+              <a:rPr lang="en-US" dirty="0" err="1"/>
+              <a:t>kurz</a:t>
+            </a:r>
+            <a:r>
+              <a:rPr lang="en-US" dirty="0"/>
+              <a:t> </a:t>
+            </a:r>
+            <a:r>
+              <a:rPr lang="en-US" dirty="0" err="1"/>
+              <a:t>näher</a:t>
+            </a:r>
+            <a:r>
+              <a:rPr lang="en-US" dirty="0"/>
+              <a:t> </a:t>
+            </a:r>
+            <a:r>
+              <a:rPr lang="en-US" dirty="0" err="1"/>
+              <a:t>bringen</a:t>
+            </a:r>
+            <a:endParaRPr lang="en-US" dirty="0"/>
+          </a:p>
+          <a:p>
+            <a:pPr marL="139700" indent="0">
+              <a:buNone/>
+            </a:pPr>
+            <a:r>
+              <a:rPr lang="en-US" dirty="0"/>
+              <a:t>Mobile, Web </a:t>
+            </a:r>
+            <a:r>
+              <a:rPr lang="en-US" dirty="0" err="1"/>
+              <a:t>arbeiten</a:t>
+            </a:r>
+            <a:r>
+              <a:rPr lang="en-US" dirty="0"/>
+              <a:t> </a:t>
+            </a:r>
+            <a:r>
+              <a:rPr lang="en-US" dirty="0" err="1"/>
+              <a:t>anders</a:t>
+            </a:r>
+            <a:r>
+              <a:rPr lang="en-US" dirty="0"/>
+              <a:t>, </a:t>
+            </a:r>
+            <a:r>
+              <a:rPr lang="en-US" dirty="0" err="1"/>
+              <a:t>anders</a:t>
+            </a:r>
+            <a:r>
+              <a:rPr lang="en-US" dirty="0"/>
+              <a:t> </a:t>
+            </a:r>
+            <a:r>
+              <a:rPr lang="en-US" dirty="0" err="1"/>
+              <a:t>Prinzip</a:t>
+            </a:r>
+            <a:endParaRPr lang="en-US" dirty="0"/>
+          </a:p>
+          <a:p>
+            <a:pPr marL="139700" indent="0">
+              <a:buNone/>
+            </a:pPr>
+            <a:endParaRPr lang="en-US" dirty="0"/>
+          </a:p>
+          <a:p>
+            <a:pPr marL="368300" indent="-228600">
+              <a:buAutoNum type="arabicPeriod"/>
+            </a:pPr>
+            <a:r>
+              <a:rPr lang="en-US" dirty="0"/>
+              <a:t>Mobile</a:t>
+            </a:r>
+          </a:p>
+          <a:p>
+            <a:pPr marL="368300" indent="-228600">
+              <a:buAutoNum type="arabicPeriod"/>
+            </a:pPr>
+            <a:r>
+              <a:rPr lang="en-US" dirty="0"/>
+              <a:t>Web Browser</a:t>
+            </a:r>
+            <a:endParaRPr lang="en-DE" dirty="0"/>
+          </a:p>
+        </p:txBody>
+      </p:sp>
+    </p:spTree>
+    <p:extLst>
+      <p:ext uri="{BB962C8B-B14F-4D97-AF65-F5344CB8AC3E}">
+        <p14:creationId xmlns:p14="http://schemas.microsoft.com/office/powerpoint/2010/main" val="3353167397"/>
+      </p:ext>
+    </p:extLst>
+  </p:cSld>
+  <p:clrMapOvr>
+    <a:masterClrMapping/>
+  </p:clrMapOvr>
+</p:notes>
+</file>
+
 <file path=ppt/notesSlides/notesSlide13.xml><?xml version="1.0" encoding="utf-8"?>
 <p:notes xmlns:a="http://schemas.openxmlformats.org/drawingml/2006/main" xmlns:r="http://schemas.openxmlformats.org/officeDocument/2006/relationships" xmlns:p="http://schemas.openxmlformats.org/presentationml/2006/main">
   <p:cSld>
@@ -1308,162 +1350,6 @@
               <a:buNone/>
             </a:pPr>
             <a:r>
-              <a:rPr lang="en-US" dirty="0"/>
-              <a:t>Problem </a:t>
-            </a:r>
-            <a:r>
-              <a:rPr lang="en-US" dirty="0" err="1"/>
-              <a:t>kurz</a:t>
-            </a:r>
-            <a:r>
-              <a:rPr lang="en-US" dirty="0"/>
-              <a:t> </a:t>
-            </a:r>
-            <a:r>
-              <a:rPr lang="en-US" dirty="0" err="1"/>
-              <a:t>näher</a:t>
-            </a:r>
-            <a:r>
-              <a:rPr lang="en-US" dirty="0"/>
-              <a:t> </a:t>
-            </a:r>
-            <a:r>
-              <a:rPr lang="en-US" dirty="0" err="1"/>
-              <a:t>bringen</a:t>
-            </a:r>
-            <a:endParaRPr lang="en-US" dirty="0"/>
-          </a:p>
-          <a:p>
-            <a:pPr marL="139700" indent="0">
-              <a:buNone/>
-            </a:pPr>
-            <a:r>
-              <a:rPr lang="en-US" dirty="0"/>
-              <a:t>Mobile, Web </a:t>
-            </a:r>
-            <a:r>
-              <a:rPr lang="en-US" dirty="0" err="1"/>
-              <a:t>arbeiten</a:t>
-            </a:r>
-            <a:r>
-              <a:rPr lang="en-US" dirty="0"/>
-              <a:t> </a:t>
-            </a:r>
-            <a:r>
-              <a:rPr lang="en-US" dirty="0" err="1"/>
-              <a:t>anders</a:t>
-            </a:r>
-            <a:r>
-              <a:rPr lang="en-US" dirty="0"/>
-              <a:t>, </a:t>
-            </a:r>
-            <a:r>
-              <a:rPr lang="en-US" dirty="0" err="1"/>
-              <a:t>anders</a:t>
-            </a:r>
-            <a:r>
-              <a:rPr lang="en-US" dirty="0"/>
-              <a:t> </a:t>
-            </a:r>
-            <a:r>
-              <a:rPr lang="en-US" dirty="0" err="1"/>
-              <a:t>Prinzip</a:t>
-            </a:r>
-            <a:endParaRPr lang="en-US" dirty="0"/>
-          </a:p>
-          <a:p>
-            <a:pPr marL="139700" indent="0">
-              <a:buNone/>
-            </a:pPr>
-            <a:endParaRPr lang="en-US" dirty="0"/>
-          </a:p>
-          <a:p>
-            <a:pPr marL="368300" indent="-228600">
-              <a:buAutoNum type="arabicPeriod"/>
-            </a:pPr>
-            <a:r>
-              <a:rPr lang="en-US" dirty="0"/>
-              <a:t>Mobile</a:t>
-            </a:r>
-          </a:p>
-          <a:p>
-            <a:pPr marL="368300" indent="-228600">
-              <a:buAutoNum type="arabicPeriod"/>
-            </a:pPr>
-            <a:r>
-              <a:rPr lang="en-US" dirty="0"/>
-              <a:t>Web Browser</a:t>
-            </a:r>
-            <a:endParaRPr lang="en-DE" dirty="0"/>
-          </a:p>
-        </p:txBody>
-      </p:sp>
-    </p:spTree>
-    <p:extLst>
-      <p:ext uri="{BB962C8B-B14F-4D97-AF65-F5344CB8AC3E}">
-        <p14:creationId xmlns:p14="http://schemas.microsoft.com/office/powerpoint/2010/main" val="3353167397"/>
-      </p:ext>
-    </p:extLst>
-  </p:cSld>
-  <p:clrMapOvr>
-    <a:masterClrMapping/>
-  </p:clrMapOvr>
-</p:notes>
-</file>
-
-<file path=ppt/notesSlides/notesSlide14.xml><?xml version="1.0" encoding="utf-8"?>
-<p:notes xmlns:a="http://schemas.openxmlformats.org/drawingml/2006/main" xmlns:r="http://schemas.openxmlformats.org/officeDocument/2006/relationships" xmlns:p="http://schemas.openxmlformats.org/presentationml/2006/main">
-  <p:cSld>
-    <p:spTree>
-      <p:nvGrpSpPr>
-        <p:cNvPr id="1" name=""/>
-        <p:cNvGrpSpPr/>
-        <p:nvPr/>
-      </p:nvGrpSpPr>
-      <p:grpSpPr>
-        <a:xfrm>
-          <a:off x="0" y="0"/>
-          <a:ext cx="0" cy="0"/>
-          <a:chOff x="0" y="0"/>
-          <a:chExt cx="0" cy="0"/>
-        </a:xfrm>
-      </p:grpSpPr>
-      <p:sp>
-        <p:nvSpPr>
-          <p:cNvPr id="2" name="Slide Image Placeholder 1"/>
-          <p:cNvSpPr>
-            <a:spLocks noGrp="1" noRot="1" noChangeAspect="1"/>
-          </p:cNvSpPr>
-          <p:nvPr>
-            <p:ph type="sldImg"/>
-          </p:nvPr>
-        </p:nvSpPr>
-        <p:spPr>
-          <a:xfrm>
-            <a:off x="381000" y="685800"/>
-            <a:ext cx="6096000" cy="3429000"/>
-          </a:xfrm>
-        </p:spPr>
-      </p:sp>
-      <p:sp>
-        <p:nvSpPr>
-          <p:cNvPr id="3" name="Notes Placeholder 2"/>
-          <p:cNvSpPr>
-            <a:spLocks noGrp="1"/>
-          </p:cNvSpPr>
-          <p:nvPr>
-            <p:ph type="body" idx="1"/>
-          </p:nvPr>
-        </p:nvSpPr>
-        <p:spPr/>
-        <p:txBody>
-          <a:bodyPr/>
-          <a:lstStyle/>
-          <a:p>
-            <a:pPr marL="139700" indent="0">
-              <a:buNone/>
-            </a:pPr>
-            <a:r>
               <a:rPr lang="en-US" dirty="0" err="1"/>
               <a:t>Etwas</a:t>
             </a:r>
@@ -1924,7 +1810,7 @@
 </p:notes>
 </file>
 
-<file path=ppt/notesSlides/notesSlide15.xml><?xml version="1.0" encoding="utf-8"?>
+<file path=ppt/notesSlides/notesSlide14.xml><?xml version="1.0" encoding="utf-8"?>
 <p:notes xmlns:a="http://schemas.openxmlformats.org/drawingml/2006/main" xmlns:r="http://schemas.openxmlformats.org/officeDocument/2006/relationships" xmlns:p="http://schemas.openxmlformats.org/presentationml/2006/main" showMasterSp="0" showMasterPhAnim="0">
   <p:cSld>
     <p:spTree>
@@ -2065,7 +1951,7 @@
 </p:notes>
 </file>
 
-<file path=ppt/notesSlides/notesSlide16.xml><?xml version="1.0" encoding="utf-8"?>
+<file path=ppt/notesSlides/notesSlide15.xml><?xml version="1.0" encoding="utf-8"?>
 <p:notes xmlns:a="http://schemas.openxmlformats.org/drawingml/2006/main" xmlns:r="http://schemas.openxmlformats.org/officeDocument/2006/relationships" xmlns:p="http://schemas.openxmlformats.org/presentationml/2006/main">
   <p:cSld>
     <p:spTree>
@@ -2255,7 +2141,7 @@
 </p:notes>
 </file>
 
-<file path=ppt/notesSlides/notesSlide17.xml><?xml version="1.0" encoding="utf-8"?>
+<file path=ppt/notesSlides/notesSlide16.xml><?xml version="1.0" encoding="utf-8"?>
 <p:notes xmlns:a="http://schemas.openxmlformats.org/drawingml/2006/main" xmlns:r="http://schemas.openxmlformats.org/officeDocument/2006/relationships" xmlns:p="http://schemas.openxmlformats.org/presentationml/2006/main" showMasterSp="0" showMasterPhAnim="0">
   <p:cSld>
     <p:spTree>
@@ -3491,6 +3377,179 @@
           </a:bodyPr>
           <a:lstStyle/>
           <a:p>
+            <a:r>
+              <a:rPr lang="de-DE" sz="1100" b="0" i="0" u="none" strike="noStrike" cap="none" dirty="0">
+                <a:solidFill>
+                  <a:srgbClr val="000000"/>
+                </a:solidFill>
+                <a:effectLst/>
+                <a:latin typeface="Arial"/>
+                <a:ea typeface="Arial"/>
+                <a:cs typeface="Arial"/>
+                <a:sym typeface="Arial"/>
+              </a:rPr>
+              <a:t>Fahri Opa Diesel</a:t>
+            </a:r>
+          </a:p>
+          <a:p>
+            <a:r>
+              <a:rPr lang="de-DE" sz="1100" b="0" i="0" u="none" strike="noStrike" cap="none" dirty="0">
+                <a:solidFill>
+                  <a:srgbClr val="000000"/>
+                </a:solidFill>
+                <a:effectLst/>
+                <a:latin typeface="Arial"/>
+                <a:ea typeface="Arial"/>
+                <a:cs typeface="Arial"/>
+                <a:sym typeface="Arial"/>
+              </a:rPr>
+              <a:t>Menschen Städte Köln</a:t>
+            </a:r>
+          </a:p>
+          <a:p>
+            <a:r>
+              <a:rPr lang="de-DE" sz="1100" b="0" i="0" u="none" strike="noStrike" cap="none" dirty="0">
+                <a:solidFill>
+                  <a:srgbClr val="000000"/>
+                </a:solidFill>
+                <a:effectLst/>
+                <a:latin typeface="Arial"/>
+                <a:ea typeface="Arial"/>
+                <a:cs typeface="Arial"/>
+                <a:sym typeface="Arial"/>
+              </a:rPr>
+              <a:t>Verbot für Diesel</a:t>
+            </a:r>
+          </a:p>
+          <a:p>
+            <a:r>
+              <a:rPr lang="de-DE" sz="1100" b="0" i="0" u="none" strike="noStrike" cap="none" dirty="0">
+                <a:solidFill>
+                  <a:srgbClr val="000000"/>
+                </a:solidFill>
+                <a:effectLst/>
+                <a:latin typeface="Arial"/>
+                <a:ea typeface="Arial"/>
+                <a:cs typeface="Arial"/>
+                <a:sym typeface="Arial"/>
+              </a:rPr>
+              <a:t>Timing von </a:t>
+            </a:r>
+            <a:r>
+              <a:rPr lang="de-DE" sz="1100" b="0" i="0" u="none" strike="noStrike" cap="none" dirty="0" err="1">
+                <a:solidFill>
+                  <a:srgbClr val="000000"/>
+                </a:solidFill>
+                <a:effectLst/>
+                <a:latin typeface="Arial"/>
+                <a:ea typeface="Arial"/>
+                <a:cs typeface="Arial"/>
+                <a:sym typeface="Arial"/>
+              </a:rPr>
+              <a:t>Jarzina</a:t>
+            </a:r>
+            <a:endParaRPr lang="de-DE" sz="1100" b="0" i="0" u="none" strike="noStrike" cap="none" dirty="0">
+              <a:solidFill>
+                <a:srgbClr val="000000"/>
+              </a:solidFill>
+              <a:effectLst/>
+              <a:latin typeface="Arial"/>
+              <a:ea typeface="Arial"/>
+              <a:cs typeface="Arial"/>
+              <a:sym typeface="Arial"/>
+            </a:endParaRPr>
+          </a:p>
+          <a:p>
+            <a:r>
+              <a:rPr lang="de-DE" sz="1100" b="0" i="0" u="none" strike="noStrike" cap="none" dirty="0">
+                <a:solidFill>
+                  <a:srgbClr val="000000"/>
+                </a:solidFill>
+                <a:effectLst/>
+                <a:latin typeface="Arial"/>
+                <a:ea typeface="Arial"/>
+                <a:cs typeface="Arial"/>
+                <a:sym typeface="Arial"/>
+              </a:rPr>
+              <a:t>Opa noch keine Idee</a:t>
+            </a:r>
+          </a:p>
+          <a:p>
+            <a:r>
+              <a:rPr lang="de-DE" sz="1100" b="0" i="0" u="none" strike="noStrike" cap="none" dirty="0">
+                <a:solidFill>
+                  <a:srgbClr val="000000"/>
+                </a:solidFill>
+                <a:effectLst/>
+                <a:latin typeface="Arial"/>
+                <a:ea typeface="Arial"/>
+                <a:cs typeface="Arial"/>
+                <a:sym typeface="Arial"/>
+              </a:rPr>
+              <a:t>Aber neues Auto</a:t>
+            </a:r>
+          </a:p>
+          <a:p>
+            <a:r>
+              <a:rPr lang="de-DE" sz="1100" b="0" i="0" u="none" strike="noStrike" cap="none" dirty="0">
+                <a:solidFill>
+                  <a:srgbClr val="000000"/>
+                </a:solidFill>
+                <a:effectLst/>
+                <a:latin typeface="Arial"/>
+                <a:ea typeface="Arial"/>
+                <a:cs typeface="Arial"/>
+                <a:sym typeface="Arial"/>
+              </a:rPr>
+              <a:t>Welche E-Autos (alle)</a:t>
+            </a:r>
+          </a:p>
+          <a:p>
+            <a:r>
+              <a:rPr lang="de-DE" sz="1100" b="0" i="0" u="none" strike="noStrike" cap="none" dirty="0">
+                <a:solidFill>
+                  <a:srgbClr val="000000"/>
+                </a:solidFill>
+                <a:effectLst/>
+                <a:latin typeface="Arial"/>
+                <a:ea typeface="Arial"/>
+                <a:cs typeface="Arial"/>
+                <a:sym typeface="Arial"/>
+              </a:rPr>
+              <a:t>Welche E-Autos (aktuell)</a:t>
+            </a:r>
+          </a:p>
+          <a:p>
+            <a:r>
+              <a:rPr lang="de-DE" sz="1100" b="0" i="0" u="none" strike="noStrike" cap="none" dirty="0">
+                <a:solidFill>
+                  <a:srgbClr val="000000"/>
+                </a:solidFill>
+                <a:effectLst/>
+                <a:latin typeface="Arial"/>
+                <a:ea typeface="Arial"/>
+                <a:cs typeface="Arial"/>
+                <a:sym typeface="Arial"/>
+              </a:rPr>
+              <a:t>Opas bedarf (Strecke pro Ladung)</a:t>
+            </a:r>
+          </a:p>
+          <a:p>
+            <a:r>
+              <a:rPr lang="de-DE" sz="1100" b="0" i="0" u="none" strike="noStrike" cap="none" dirty="0">
+                <a:solidFill>
+                  <a:srgbClr val="000000"/>
+                </a:solidFill>
+                <a:effectLst/>
+                <a:latin typeface="Arial"/>
+                <a:ea typeface="Arial"/>
+                <a:cs typeface="Arial"/>
+                <a:sym typeface="Arial"/>
+              </a:rPr>
+              <a:t>Vorstellen unserer Hilfestellung</a:t>
+            </a:r>
+          </a:p>
+          <a:p>
             <a:pPr marL="0" lvl="0" indent="0" algn="l" rtl="0">
               <a:spcBef>
                 <a:spcPts val="0"/>
@@ -3500,122 +3559,6 @@
               </a:spcAft>
               <a:buNone/>
             </a:pPr>
-            <a:r>
-              <a:rPr lang="en-US" dirty="0" err="1"/>
-              <a:t>Ggf</a:t>
-            </a:r>
-            <a:r>
-              <a:rPr lang="en-US" dirty="0"/>
-              <a:t>. </a:t>
-            </a:r>
-            <a:r>
-              <a:rPr lang="en-US" dirty="0" err="1"/>
-              <a:t>Im</a:t>
-            </a:r>
-            <a:r>
-              <a:rPr lang="en-US" dirty="0"/>
-              <a:t> </a:t>
-            </a:r>
-            <a:r>
-              <a:rPr lang="en-US" dirty="0" err="1"/>
-              <a:t>nebenssatz</a:t>
-            </a:r>
-            <a:r>
-              <a:rPr lang="en-US" dirty="0"/>
-              <a:t> </a:t>
-            </a:r>
-            <a:r>
-              <a:rPr lang="en-US" dirty="0" err="1"/>
-              <a:t>erwähnen</a:t>
-            </a:r>
-            <a:r>
-              <a:rPr lang="en-US" dirty="0"/>
-              <a:t>, das </a:t>
-            </a:r>
-            <a:r>
-              <a:rPr lang="en-US" dirty="0" err="1"/>
-              <a:t>Anmelden</a:t>
-            </a:r>
-            <a:r>
-              <a:rPr lang="en-US" dirty="0"/>
-              <a:t> und </a:t>
-            </a:r>
-            <a:r>
-              <a:rPr lang="en-US" dirty="0" err="1"/>
-              <a:t>Registrieren</a:t>
-            </a:r>
-            <a:r>
-              <a:rPr lang="en-US" dirty="0"/>
-              <a:t> </a:t>
-            </a:r>
-            <a:r>
-              <a:rPr lang="en-US" dirty="0" err="1"/>
-              <a:t>fertig</a:t>
-            </a:r>
-            <a:r>
-              <a:rPr lang="en-US" dirty="0"/>
-              <a:t> </a:t>
-            </a:r>
-            <a:r>
-              <a:rPr lang="en-US" dirty="0" err="1"/>
-              <a:t>ist</a:t>
-            </a:r>
-            <a:r>
-              <a:rPr lang="en-US" dirty="0"/>
-              <a:t>, </a:t>
-            </a:r>
-            <a:r>
-              <a:rPr lang="en-US" dirty="0" err="1"/>
-              <a:t>aber</a:t>
-            </a:r>
-            <a:r>
-              <a:rPr lang="en-US" dirty="0"/>
-              <a:t> </a:t>
-            </a:r>
-            <a:r>
-              <a:rPr lang="en-US" dirty="0" err="1"/>
-              <a:t>aus</a:t>
-            </a:r>
-            <a:r>
-              <a:rPr lang="en-US" dirty="0"/>
-              <a:t> </a:t>
-            </a:r>
-            <a:r>
-              <a:rPr lang="en-US" dirty="0" err="1"/>
-              <a:t>banalität</a:t>
-            </a:r>
-            <a:r>
-              <a:rPr lang="en-US" dirty="0"/>
-              <a:t> und </a:t>
-            </a:r>
-            <a:r>
-              <a:rPr lang="en-US" dirty="0" err="1"/>
-              <a:t>zeitgründen</a:t>
-            </a:r>
-            <a:r>
-              <a:rPr lang="en-US" dirty="0"/>
-              <a:t> </a:t>
-            </a:r>
-            <a:r>
-              <a:rPr lang="en-US" dirty="0" err="1"/>
-              <a:t>nicht</a:t>
-            </a:r>
-            <a:r>
-              <a:rPr lang="en-US" dirty="0"/>
-              <a:t> </a:t>
-            </a:r>
-            <a:r>
-              <a:rPr lang="en-US" dirty="0" err="1"/>
-              <a:t>vorgeführt</a:t>
-            </a:r>
-            <a:r>
-              <a:rPr lang="en-US" dirty="0"/>
-              <a:t> </a:t>
-            </a:r>
-            <a:r>
-              <a:rPr lang="en-US" dirty="0" err="1"/>
-              <a:t>wird</a:t>
-            </a:r>
             <a:endParaRPr dirty="0"/>
           </a:p>
         </p:txBody>
@@ -3687,24 +3630,7 @@
             </a:pPr>
             <a:r>
               <a:rPr lang="en-US" dirty="0" err="1"/>
-              <a:t>Savety</a:t>
-            </a:r>
-            <a:r>
-              <a:rPr lang="en-US" dirty="0"/>
-              <a:t> first.</a:t>
-            </a:r>
-          </a:p>
-          <a:p>
-            <a:pPr marL="139700" indent="0">
-              <a:buNone/>
-            </a:pPr>
-            <a:r>
-              <a:rPr lang="en-US" dirty="0"/>
-              <a:t>Falls DEMO </a:t>
-            </a:r>
-            <a:r>
-              <a:rPr lang="en-US" dirty="0" err="1"/>
-              <a:t>aus</a:t>
+              <a:t>Besondere</a:t>
             </a:r>
             <a:r>
               <a:rPr lang="en-US" dirty="0"/>
@@ -3712,7 +3638,7 @@
             </a:r>
             <a:r>
               <a:rPr lang="en-US" dirty="0" err="1"/>
-              <a:t>irgendeinem</a:t>
+              <a:t>teschniche</a:t>
             </a:r>
             <a:r>
               <a:rPr lang="en-US" dirty="0"/>
@@ -3720,7 +3646,23 @@
             </a:r>
             <a:r>
               <a:rPr lang="en-US" dirty="0" err="1"/>
-              <a:t>Grund</a:t>
+              <a:t>Herausforderung</a:t>
+            </a:r>
+            <a:r>
+              <a:rPr lang="en-US" dirty="0"/>
+              <a:t>: </a:t>
+            </a:r>
+            <a:r>
+              <a:rPr lang="en-US" dirty="0" err="1"/>
+              <a:t>Applikation</a:t>
+            </a:r>
+            <a:r>
+              <a:rPr lang="en-US" dirty="0"/>
+              <a:t> von </a:t>
+            </a:r>
+            <a:r>
+              <a:rPr lang="en-US" dirty="0" err="1"/>
+              <a:t>überall</a:t>
             </a:r>
             <a:r>
               <a:rPr lang="en-US" dirty="0"/>
@@ -3728,191 +3670,11 @@
             </a:r>
             <a:r>
               <a:rPr lang="en-US" dirty="0" err="1"/>
-              <a:t>nicht</a:t>
+              <a:t>erreichbar</a:t>
             </a:r>
             <a:r>
               <a:rPr lang="en-US" dirty="0"/>
-              <a:t> </a:t>
-            </a:r>
-            <a:r>
-              <a:rPr lang="en-US" dirty="0" err="1"/>
-              <a:t>funktioniert</a:t>
-            </a:r>
-            <a:r>
-              <a:rPr lang="en-US" dirty="0"/>
-              <a:t> </a:t>
-            </a:r>
-            <a:r>
-              <a:rPr lang="en-US" dirty="0" err="1"/>
-              <a:t>bzw</a:t>
-            </a:r>
-            <a:r>
-              <a:rPr lang="en-US" dirty="0"/>
-              <a:t>. </a:t>
-            </a:r>
-            <a:r>
-              <a:rPr lang="en-US" dirty="0" err="1"/>
-              <a:t>Für</a:t>
-            </a:r>
-            <a:r>
-              <a:rPr lang="en-US" dirty="0"/>
-              <a:t> die PDF</a:t>
-            </a:r>
-          </a:p>
-          <a:p>
-            <a:pPr marL="139700" indent="0">
-              <a:buNone/>
-            </a:pPr>
-            <a:endParaRPr lang="en-US" dirty="0"/>
-          </a:p>
-          <a:p>
-            <a:pPr marL="139700" indent="0">
-              <a:buNone/>
-            </a:pPr>
-            <a:r>
-              <a:rPr lang="en-US" dirty="0"/>
-              <a:t>Am </a:t>
-            </a:r>
-            <a:r>
-              <a:rPr lang="en-US" dirty="0" err="1"/>
-              <a:t>Besten</a:t>
-            </a:r>
-            <a:r>
-              <a:rPr lang="en-US" dirty="0"/>
-              <a:t> </a:t>
-            </a:r>
-            <a:r>
-              <a:rPr lang="en-US" dirty="0" err="1"/>
-              <a:t>als</a:t>
-            </a:r>
-            <a:r>
-              <a:rPr lang="en-US" dirty="0"/>
-              <a:t> Story </a:t>
-            </a:r>
-            <a:r>
-              <a:rPr lang="en-US" dirty="0" err="1"/>
-              <a:t>verpacken</a:t>
-            </a:r>
-            <a:r>
-              <a:rPr lang="en-US" dirty="0"/>
-              <a:t>.</a:t>
-            </a:r>
-          </a:p>
-          <a:p>
-            <a:pPr marL="139700" indent="0">
-              <a:buNone/>
-            </a:pPr>
-            <a:endParaRPr lang="en-US" dirty="0"/>
-          </a:p>
-          <a:p>
-            <a:pPr marL="139700" indent="0">
-              <a:buNone/>
-            </a:pPr>
-            <a:r>
-              <a:rPr lang="en-US" dirty="0"/>
-              <a:t>Web: Demo: </a:t>
-            </a:r>
-            <a:r>
-              <a:rPr lang="en-US" dirty="0" err="1"/>
-              <a:t>Hauptseite</a:t>
-            </a:r>
-            <a:r>
-              <a:rPr lang="en-US" dirty="0"/>
-              <a:t>, Filter </a:t>
-            </a:r>
-            <a:r>
-              <a:rPr lang="en-US" dirty="0" err="1"/>
-              <a:t>Beispiele</a:t>
-            </a:r>
-            <a:endParaRPr lang="en-US" dirty="0"/>
-          </a:p>
-          <a:p>
-            <a:pPr marL="139700" indent="0">
-              <a:buNone/>
-            </a:pPr>
-            <a:r>
-              <a:rPr lang="en-US" dirty="0"/>
-              <a:t>Mobile </a:t>
-            </a:r>
-            <a:r>
-              <a:rPr lang="en-US" dirty="0" err="1"/>
-              <a:t>Ansicht</a:t>
-            </a:r>
-            <a:endParaRPr lang="en-US" dirty="0"/>
-          </a:p>
-          <a:p>
-            <a:pPr marL="139700" indent="0">
-              <a:buNone/>
-            </a:pPr>
-            <a:endParaRPr lang="en-US" dirty="0"/>
-          </a:p>
-          <a:p>
-            <a:pPr marL="139700" indent="0">
-              <a:buNone/>
-            </a:pPr>
-            <a:r>
-              <a:rPr lang="en-US" dirty="0" err="1"/>
-              <a:t>Wenn</a:t>
-            </a:r>
-            <a:r>
-              <a:rPr lang="en-US" dirty="0"/>
-              <a:t> </a:t>
-            </a:r>
-            <a:r>
-              <a:rPr lang="en-US" dirty="0" err="1"/>
-              <a:t>zu</a:t>
-            </a:r>
-            <a:r>
-              <a:rPr lang="en-US" dirty="0"/>
-              <a:t> schnell, </a:t>
-            </a:r>
-            <a:r>
-              <a:rPr lang="en-US" dirty="0" err="1"/>
-              <a:t>dann</a:t>
-            </a:r>
-            <a:r>
-              <a:rPr lang="en-US" dirty="0"/>
-              <a:t> </a:t>
-            </a:r>
-            <a:r>
-              <a:rPr lang="en-US" dirty="0" err="1"/>
-              <a:t>kurz</a:t>
-            </a:r>
-            <a:r>
-              <a:rPr lang="en-US" dirty="0"/>
-              <a:t> die </a:t>
-            </a:r>
-            <a:r>
-              <a:rPr lang="en-US" dirty="0" err="1"/>
-              <a:t>Reistrierung</a:t>
-            </a:r>
-            <a:r>
-              <a:rPr lang="en-US" dirty="0"/>
-              <a:t> und </a:t>
-            </a:r>
-            <a:r>
-              <a:rPr lang="en-US" dirty="0" err="1"/>
-              <a:t>Anmelde</a:t>
-            </a:r>
-            <a:r>
-              <a:rPr lang="en-US" dirty="0"/>
-              <a:t> </a:t>
-            </a:r>
-            <a:r>
-              <a:rPr lang="en-US" dirty="0" err="1"/>
-              <a:t>Maske</a:t>
-            </a:r>
-            <a:r>
-              <a:rPr lang="en-US" dirty="0"/>
-              <a:t> </a:t>
-            </a:r>
-            <a:r>
-              <a:rPr lang="en-US" dirty="0" err="1"/>
-              <a:t>zeigen</a:t>
-            </a:r>
-            <a:r>
-              <a:rPr lang="en-US" dirty="0"/>
-              <a:t>.</a:t>
+              <a:t>. Web, Mobile, etc.</a:t>
             </a:r>
             <a:endParaRPr lang="en-DE" dirty="0"/>
           </a:p>
@@ -3921,7 +3683,7 @@
     </p:spTree>
     <p:extLst>
       <p:ext uri="{BB962C8B-B14F-4D97-AF65-F5344CB8AC3E}">
-        <p14:creationId xmlns:p14="http://schemas.microsoft.com/office/powerpoint/2010/main" val="1855404744"/>
+        <p14:creationId xmlns:p14="http://schemas.microsoft.com/office/powerpoint/2010/main" val="3009084432"/>
       </p:ext>
     </p:extLst>
   </p:cSld>
@@ -4566,7 +4328,7 @@
             </a:pPr>
             <a:fld id="{00000000-1234-1234-1234-123412341234}" type="slidenum">
               <a:rPr lang="de-DE" smtClean="0"/>
-              <a:t>‹#›</a:t>
+              <a:t>‹Nr.›</a:t>
             </a:fld>
             <a:endParaRPr lang="de-DE"/>
           </a:p>
@@ -6403,7 +6165,7 @@
             </a:pPr>
             <a:fld id="{00000000-1234-1234-1234-123412341234}" type="slidenum">
               <a:rPr lang="en"/>
-              <a:t>‹#›</a:t>
+              <a:t>‹Nr.›</a:t>
             </a:fld>
             <a:endParaRPr/>
           </a:p>
@@ -7036,7 +6798,7 @@
             </a:pPr>
             <a:fld id="{00000000-1234-1234-1234-123412341234}" type="slidenum">
               <a:rPr lang="en"/>
-              <a:t>‹#›</a:t>
+              <a:t>‹Nr.›</a:t>
             </a:fld>
             <a:endParaRPr/>
           </a:p>
@@ -7398,7 +7160,7 @@
             </a:pPr>
             <a:fld id="{00000000-1234-1234-1234-123412341234}" type="slidenum">
               <a:rPr lang="en"/>
-              <a:t>‹#›</a:t>
+              <a:t>‹Nr.›</a:t>
             </a:fld>
             <a:endParaRPr/>
           </a:p>
@@ -7906,7 +7668,7 @@
             </a:pPr>
             <a:fld id="{00000000-1234-1234-1234-123412341234}" type="slidenum">
               <a:rPr lang="en"/>
-              <a:t>‹#›</a:t>
+              <a:t>‹Nr.›</a:t>
             </a:fld>
             <a:endParaRPr/>
           </a:p>
@@ -8462,7 +8224,7 @@
             </a:pPr>
             <a:fld id="{00000000-1234-1234-1234-123412341234}" type="slidenum">
               <a:rPr lang="en"/>
-              <a:t>‹#›</a:t>
+              <a:t>‹Nr.›</a:t>
             </a:fld>
             <a:endParaRPr dirty="0"/>
           </a:p>
@@ -10011,127 +9773,6 @@
       </p:grpSpPr>
       <p:sp>
         <p:nvSpPr>
-          <p:cNvPr id="2" name="Title 1">
-            <a:extLst>
-              <a:ext uri="{FF2B5EF4-FFF2-40B4-BE49-F238E27FC236}">
-                <a16:creationId xmlns:a16="http://schemas.microsoft.com/office/drawing/2014/main" id="{B94B0667-0BB5-416B-9DF3-70F98FE6168C}"/>
-              </a:ext>
-            </a:extLst>
-          </p:cNvPr>
-          <p:cNvSpPr>
-            <a:spLocks noGrp="1"/>
-          </p:cNvSpPr>
-          <p:nvPr>
-            <p:ph type="title"/>
-          </p:nvPr>
-        </p:nvSpPr>
-        <p:spPr/>
-        <p:txBody>
-          <a:bodyPr/>
-          <a:lstStyle/>
-          <a:p>
-            <a:endParaRPr lang="en-DE"/>
-          </a:p>
-        </p:txBody>
-      </p:sp>
-      <p:sp>
-        <p:nvSpPr>
-          <p:cNvPr id="3" name="Text Placeholder 2">
-            <a:extLst>
-              <a:ext uri="{FF2B5EF4-FFF2-40B4-BE49-F238E27FC236}">
-                <a16:creationId xmlns:a16="http://schemas.microsoft.com/office/drawing/2014/main" id="{51701602-80CD-42C6-8A06-79DC9E729894}"/>
-              </a:ext>
-            </a:extLst>
-          </p:cNvPr>
-          <p:cNvSpPr>
-            <a:spLocks noGrp="1"/>
-          </p:cNvSpPr>
-          <p:nvPr>
-            <p:ph type="body" idx="1"/>
-          </p:nvPr>
-        </p:nvSpPr>
-        <p:spPr/>
-        <p:txBody>
-          <a:bodyPr/>
-          <a:lstStyle/>
-          <a:p>
-            <a:endParaRPr lang="en-DE"/>
-          </a:p>
-        </p:txBody>
-      </p:sp>
-      <p:sp>
-        <p:nvSpPr>
-          <p:cNvPr id="4" name="Slide Number Placeholder 3">
-            <a:extLst>
-              <a:ext uri="{FF2B5EF4-FFF2-40B4-BE49-F238E27FC236}">
-                <a16:creationId xmlns:a16="http://schemas.microsoft.com/office/drawing/2014/main" id="{42581076-4232-46C9-8D6A-6C816E942F65}"/>
-              </a:ext>
-            </a:extLst>
-          </p:cNvPr>
-          <p:cNvSpPr>
-            <a:spLocks noGrp="1"/>
-          </p:cNvSpPr>
-          <p:nvPr>
-            <p:ph type="sldNum" idx="12"/>
-          </p:nvPr>
-        </p:nvSpPr>
-        <p:spPr/>
-        <p:txBody>
-          <a:bodyPr/>
-          <a:lstStyle/>
-          <a:p>
-            <a:pPr marL="0" lvl="0" indent="0" algn="ctr" rtl="0">
-              <a:spcBef>
-                <a:spcPts val="0"/>
-              </a:spcBef>
-              <a:spcAft>
-                <a:spcPts val="0"/>
-              </a:spcAft>
-              <a:buNone/>
-            </a:pPr>
-            <a:fld id="{00000000-1234-1234-1234-123412341234}" type="slidenum">
-              <a:rPr lang="en" smtClean="0"/>
-              <a:t>10</a:t>
-            </a:fld>
-            <a:endParaRPr lang="en"/>
-          </a:p>
-        </p:txBody>
-      </p:sp>
-    </p:spTree>
-    <p:extLst>
-      <p:ext uri="{BB962C8B-B14F-4D97-AF65-F5344CB8AC3E}">
-        <p14:creationId xmlns:p14="http://schemas.microsoft.com/office/powerpoint/2010/main" val="383329481"/>
-      </p:ext>
-    </p:extLst>
-  </p:cSld>
-  <p:clrMapOvr>
-    <a:masterClrMapping/>
-  </p:clrMapOvr>
-  <p:transition advTm="219">
-    <p:fade thruBlk="1"/>
-  </p:transition>
-</p:sld>
-</file>
-
-<file path=ppt/slides/slide11.xml><?xml version="1.0" encoding="utf-8"?>
-<p:sld xmlns:a="http://schemas.openxmlformats.org/drawingml/2006/main" xmlns:r="http://schemas.openxmlformats.org/officeDocument/2006/relationships" xmlns:p="http://schemas.openxmlformats.org/presentationml/2006/main">
-  <p:cSld>
-    <p:spTree>
-      <p:nvGrpSpPr>
-        <p:cNvPr id="1" name=""/>
-        <p:cNvGrpSpPr/>
-        <p:nvPr/>
-      </p:nvGrpSpPr>
-      <p:grpSpPr>
-        <a:xfrm>
-          <a:off x="0" y="0"/>
-          <a:ext cx="0" cy="0"/>
-          <a:chOff x="0" y="0"/>
-          <a:chExt cx="0" cy="0"/>
-        </a:xfrm>
-      </p:grpSpPr>
-      <p:sp>
-        <p:nvSpPr>
           <p:cNvPr id="7" name="Heart 6">
             <a:extLst>
               <a:ext uri="{FF2B5EF4-FFF2-40B4-BE49-F238E27FC236}">
@@ -10243,7 +9884,7 @@
             </a:pPr>
             <a:fld id="{00000000-1234-1234-1234-123412341234}" type="slidenum">
               <a:rPr lang="en" smtClean="0"/>
-              <a:t>11</a:t>
+              <a:t>10</a:t>
             </a:fld>
             <a:endParaRPr lang="en"/>
           </a:p>
@@ -10662,7 +10303,7 @@
 </p:sld>
 </file>
 
-<file path=ppt/slides/slide12.xml><?xml version="1.0" encoding="utf-8"?>
+<file path=ppt/slides/slide11.xml><?xml version="1.0" encoding="utf-8"?>
 <p:sld xmlns:a="http://schemas.openxmlformats.org/drawingml/2006/main" xmlns:r="http://schemas.openxmlformats.org/officeDocument/2006/relationships" xmlns:p="http://schemas.openxmlformats.org/presentationml/2006/main">
   <p:cSld>
     <p:spTree>
@@ -10815,7 +10456,7 @@
 </p:sld>
 </file>
 
-<file path=ppt/slides/slide13.xml><?xml version="1.0" encoding="utf-8"?>
+<file path=ppt/slides/slide12.xml><?xml version="1.0" encoding="utf-8"?>
 <p:sld xmlns:a="http://schemas.openxmlformats.org/drawingml/2006/main" xmlns:r="http://schemas.openxmlformats.org/officeDocument/2006/relationships" xmlns:p="http://schemas.openxmlformats.org/presentationml/2006/main">
   <p:cSld>
     <p:spTree>
@@ -10957,7 +10598,7 @@
             </a:pPr>
             <a:fld id="{00000000-1234-1234-1234-123412341234}" type="slidenum">
               <a:rPr lang="de-DE" smtClean="0"/>
-              <a:t>13</a:t>
+              <a:t>12</a:t>
             </a:fld>
             <a:endParaRPr lang="de-DE"/>
           </a:p>
@@ -12433,7 +12074,7 @@
 </p:sld>
 </file>
 
-<file path=ppt/slides/slide14.xml><?xml version="1.0" encoding="utf-8"?>
+<file path=ppt/slides/slide13.xml><?xml version="1.0" encoding="utf-8"?>
 <p:sld xmlns:a="http://schemas.openxmlformats.org/drawingml/2006/main" xmlns:r="http://schemas.openxmlformats.org/officeDocument/2006/relationships" xmlns:p="http://schemas.openxmlformats.org/presentationml/2006/main">
   <p:cSld>
     <p:spTree>
@@ -12482,7 +12123,7 @@
             </a:pPr>
             <a:fld id="{00000000-1234-1234-1234-123412341234}" type="slidenum">
               <a:rPr lang="en" smtClean="0"/>
-              <a:t>14</a:t>
+              <a:t>13</a:t>
             </a:fld>
             <a:endParaRPr lang="en"/>
           </a:p>
@@ -13405,7 +13046,7 @@
 </p:sld>
 </file>
 
-<file path=ppt/slides/slide15.xml><?xml version="1.0" encoding="utf-8"?>
+<file path=ppt/slides/slide14.xml><?xml version="1.0" encoding="utf-8"?>
 <p:sld xmlns:a="http://schemas.openxmlformats.org/drawingml/2006/main" xmlns:r="http://schemas.openxmlformats.org/officeDocument/2006/relationships" xmlns:p="http://schemas.openxmlformats.org/presentationml/2006/main">
   <p:cSld>
     <p:spTree>
@@ -13454,7 +13095,7 @@
             </a:pPr>
             <a:fld id="{00000000-1234-1234-1234-123412341234}" type="slidenum">
               <a:rPr lang="en" smtClean="0"/>
-              <a:t>15</a:t>
+              <a:t>14</a:t>
             </a:fld>
             <a:endParaRPr lang="en"/>
           </a:p>
@@ -14432,7 +14073,7 @@
 </p:sld>
 </file>
 
-<file path=ppt/slides/slide16.xml><?xml version="1.0" encoding="utf-8"?>
+<file path=ppt/slides/slide15.xml><?xml version="1.0" encoding="utf-8"?>
 <p:sld xmlns:a="http://schemas.openxmlformats.org/drawingml/2006/main" xmlns:r="http://schemas.openxmlformats.org/officeDocument/2006/relationships" xmlns:p="http://schemas.openxmlformats.org/presentationml/2006/main">
   <p:cSld>
     <p:spTree>
@@ -14603,7 +14244,7 @@
 </p:sld>
 </file>
 
-<file path=ppt/slides/slide17.xml><?xml version="1.0" encoding="utf-8"?>
+<file path=ppt/slides/slide16.xml><?xml version="1.0" encoding="utf-8"?>
 <p:sld xmlns:a="http://schemas.openxmlformats.org/drawingml/2006/main" xmlns:r="http://schemas.openxmlformats.org/officeDocument/2006/relationships" xmlns:p="http://schemas.openxmlformats.org/presentationml/2006/main">
   <p:cSld>
     <p:spTree>
@@ -14652,7 +14293,7 @@
             </a:pPr>
             <a:fld id="{00000000-1234-1234-1234-123412341234}" type="slidenum">
               <a:rPr lang="en" smtClean="0"/>
-              <a:t>17</a:t>
+              <a:t>16</a:t>
             </a:fld>
             <a:endParaRPr lang="en"/>
           </a:p>
@@ -15846,7 +15487,7 @@
 </p:sld>
 </file>
 
-<file path=ppt/slides/slide18.xml><?xml version="1.0" encoding="utf-8"?>
+<file path=ppt/slides/slide17.xml><?xml version="1.0" encoding="utf-8"?>
 <p:sld xmlns:a="http://schemas.openxmlformats.org/drawingml/2006/main" xmlns:r="http://schemas.openxmlformats.org/officeDocument/2006/relationships" xmlns:p="http://schemas.openxmlformats.org/presentationml/2006/main">
   <p:cSld>
     <p:spTree>
@@ -16150,7 +15791,7 @@
             </a:pPr>
             <a:fld id="{00000000-1234-1234-1234-123412341234}" type="slidenum">
               <a:rPr lang="de-DE" smtClean="0"/>
-              <a:t>18</a:t>
+              <a:t>17</a:t>
             </a:fld>
             <a:endParaRPr lang="de-DE"/>
           </a:p>

</xml_diff>